<commit_message>
Changes to the document
</commit_message>
<xml_diff>
--- a/Documents/graphics/Graphics.pptx
+++ b/Documents/graphics/Graphics.pptx
@@ -5,10 +5,12 @@
     <p:sldMasterId id="2147483648" r:id="rId1"/>
   </p:sldMasterIdLst>
   <p:notesMasterIdLst>
-    <p:notesMasterId r:id="rId3"/>
+    <p:notesMasterId r:id="rId5"/>
   </p:notesMasterIdLst>
   <p:sldIdLst>
     <p:sldId id="256" r:id="rId2"/>
+    <p:sldId id="257" r:id="rId3"/>
+    <p:sldId id="258" r:id="rId4"/>
   </p:sldIdLst>
   <p:sldSz cx="12192000" cy="6858000"/>
   <p:notesSz cx="6858000" cy="9144000"/>
@@ -107,6 +109,11 @@
       </a:defRPr>
     </a:lvl9pPr>
   </p:defaultTextStyle>
+  <p:extLst>
+    <p:ext uri="{EFAFB233-063F-42B5-8137-9DF3F51BA10A}">
+      <p15:sldGuideLst xmlns:p15="http://schemas.microsoft.com/office/powerpoint/2012/main"/>
+    </p:ext>
+  </p:extLst>
 </p:presentation>
 </file>
 
@@ -192,7 +199,7 @@
           <a:p>
             <a:fld id="{559CD18D-7E71-4345-BC5D-7CB7DC0EBDCC}" type="datetimeFigureOut">
               <a:rPr lang="en-US" smtClean="0"/>
-              <a:t>11/19/17</a:t>
+              <a:t>1/3/18</a:t>
             </a:fld>
             <a:endParaRPr lang="en-US"/>
           </a:p>
@@ -591,7 +598,7 @@
           <a:p>
             <a:fld id="{AADE8FE6-F29D-8D45-A0A6-71FE9D3F776C}" type="datetimeFigureOut">
               <a:rPr lang="en-US" smtClean="0"/>
-              <a:t>11/19/17</a:t>
+              <a:t>1/3/18</a:t>
             </a:fld>
             <a:endParaRPr lang="en-US"/>
           </a:p>
@@ -761,7 +768,7 @@
           <a:p>
             <a:fld id="{AADE8FE6-F29D-8D45-A0A6-71FE9D3F776C}" type="datetimeFigureOut">
               <a:rPr lang="en-US" smtClean="0"/>
-              <a:t>11/19/17</a:t>
+              <a:t>1/3/18</a:t>
             </a:fld>
             <a:endParaRPr lang="en-US"/>
           </a:p>
@@ -941,7 +948,7 @@
           <a:p>
             <a:fld id="{AADE8FE6-F29D-8D45-A0A6-71FE9D3F776C}" type="datetimeFigureOut">
               <a:rPr lang="en-US" smtClean="0"/>
-              <a:t>11/19/17</a:t>
+              <a:t>1/3/18</a:t>
             </a:fld>
             <a:endParaRPr lang="en-US"/>
           </a:p>
@@ -1111,7 +1118,7 @@
           <a:p>
             <a:fld id="{AADE8FE6-F29D-8D45-A0A6-71FE9D3F776C}" type="datetimeFigureOut">
               <a:rPr lang="en-US" smtClean="0"/>
-              <a:t>11/19/17</a:t>
+              <a:t>1/3/18</a:t>
             </a:fld>
             <a:endParaRPr lang="en-US"/>
           </a:p>
@@ -1357,7 +1364,7 @@
           <a:p>
             <a:fld id="{AADE8FE6-F29D-8D45-A0A6-71FE9D3F776C}" type="datetimeFigureOut">
               <a:rPr lang="en-US" smtClean="0"/>
-              <a:t>11/19/17</a:t>
+              <a:t>1/3/18</a:t>
             </a:fld>
             <a:endParaRPr lang="en-US"/>
           </a:p>
@@ -1589,7 +1596,7 @@
           <a:p>
             <a:fld id="{AADE8FE6-F29D-8D45-A0A6-71FE9D3F776C}" type="datetimeFigureOut">
               <a:rPr lang="en-US" smtClean="0"/>
-              <a:t>11/19/17</a:t>
+              <a:t>1/3/18</a:t>
             </a:fld>
             <a:endParaRPr lang="en-US"/>
           </a:p>
@@ -1956,7 +1963,7 @@
           <a:p>
             <a:fld id="{AADE8FE6-F29D-8D45-A0A6-71FE9D3F776C}" type="datetimeFigureOut">
               <a:rPr lang="en-US" smtClean="0"/>
-              <a:t>11/19/17</a:t>
+              <a:t>1/3/18</a:t>
             </a:fld>
             <a:endParaRPr lang="en-US"/>
           </a:p>
@@ -2074,7 +2081,7 @@
           <a:p>
             <a:fld id="{AADE8FE6-F29D-8D45-A0A6-71FE9D3F776C}" type="datetimeFigureOut">
               <a:rPr lang="en-US" smtClean="0"/>
-              <a:t>11/19/17</a:t>
+              <a:t>1/3/18</a:t>
             </a:fld>
             <a:endParaRPr lang="en-US"/>
           </a:p>
@@ -2169,7 +2176,7 @@
           <a:p>
             <a:fld id="{AADE8FE6-F29D-8D45-A0A6-71FE9D3F776C}" type="datetimeFigureOut">
               <a:rPr lang="en-US" smtClean="0"/>
-              <a:t>11/19/17</a:t>
+              <a:t>1/3/18</a:t>
             </a:fld>
             <a:endParaRPr lang="en-US"/>
           </a:p>
@@ -2446,7 +2453,7 @@
           <a:p>
             <a:fld id="{AADE8FE6-F29D-8D45-A0A6-71FE9D3F776C}" type="datetimeFigureOut">
               <a:rPr lang="en-US" smtClean="0"/>
-              <a:t>11/19/17</a:t>
+              <a:t>1/3/18</a:t>
             </a:fld>
             <a:endParaRPr lang="en-US"/>
           </a:p>
@@ -2699,7 +2706,7 @@
           <a:p>
             <a:fld id="{AADE8FE6-F29D-8D45-A0A6-71FE9D3F776C}" type="datetimeFigureOut">
               <a:rPr lang="en-US" smtClean="0"/>
-              <a:t>11/19/17</a:t>
+              <a:t>1/3/18</a:t>
             </a:fld>
             <a:endParaRPr lang="en-US"/>
           </a:p>
@@ -2912,7 +2919,7 @@
           <a:p>
             <a:fld id="{AADE8FE6-F29D-8D45-A0A6-71FE9D3F776C}" type="datetimeFigureOut">
               <a:rPr lang="en-US" smtClean="0"/>
-              <a:t>11/19/17</a:t>
+              <a:t>1/3/18</a:t>
             </a:fld>
             <a:endParaRPr lang="en-US"/>
           </a:p>
@@ -4549,6 +4556,1636 @@
       </p:par>
     </p:tnLst>
   </p:timing>
+</p:sld>
+</file>
+
+<file path=ppt/slides/slide2.xml><?xml version="1.0" encoding="utf-8"?>
+<p:sld xmlns:a="http://schemas.openxmlformats.org/drawingml/2006/main" xmlns:r="http://schemas.openxmlformats.org/officeDocument/2006/relationships" xmlns:p="http://schemas.openxmlformats.org/presentationml/2006/main">
+  <p:cSld>
+    <p:spTree>
+      <p:nvGrpSpPr>
+        <p:cNvPr id="1" name=""/>
+        <p:cNvGrpSpPr/>
+        <p:nvPr/>
+      </p:nvGrpSpPr>
+      <p:grpSpPr>
+        <a:xfrm>
+          <a:off x="0" y="0"/>
+          <a:ext cx="0" cy="0"/>
+          <a:chOff x="0" y="0"/>
+          <a:chExt cx="0" cy="0"/>
+        </a:xfrm>
+      </p:grpSpPr>
+      <p:sp>
+        <p:nvSpPr>
+          <p:cNvPr id="5" name="Rectangle 4"/>
+          <p:cNvSpPr/>
+          <p:nvPr/>
+        </p:nvSpPr>
+        <p:spPr>
+          <a:xfrm>
+            <a:off x="527527" y="2851376"/>
+            <a:ext cx="3086010" cy="1285873"/>
+          </a:xfrm>
+          <a:prstGeom prst="rect">
+            <a:avLst/>
+          </a:prstGeom>
+          <a:noFill/>
+          <a:ln>
+            <a:solidFill>
+              <a:schemeClr val="tx1"/>
+            </a:solidFill>
+          </a:ln>
+        </p:spPr>
+        <p:style>
+          <a:lnRef idx="2">
+            <a:schemeClr val="accent1">
+              <a:shade val="50000"/>
+            </a:schemeClr>
+          </a:lnRef>
+          <a:fillRef idx="1">
+            <a:schemeClr val="accent1"/>
+          </a:fillRef>
+          <a:effectRef idx="0">
+            <a:schemeClr val="accent1"/>
+          </a:effectRef>
+          <a:fontRef idx="minor">
+            <a:schemeClr val="lt1"/>
+          </a:fontRef>
+        </p:style>
+        <p:txBody>
+          <a:bodyPr rtlCol="0" anchor="ctr"/>
+          <a:lstStyle/>
+          <a:p>
+            <a:pPr algn="ctr"/>
+            <a:r>
+              <a:rPr lang="en-US" smtClean="0">
+                <a:solidFill>
+                  <a:schemeClr val="tx1"/>
+                </a:solidFill>
+              </a:rPr>
+              <a:t>Database</a:t>
+            </a:r>
+            <a:r>
+              <a:rPr lang="en-US" smtClean="0"/>
+              <a:t>f</a:t>
+            </a:r>
+            <a:endParaRPr lang="en-US" dirty="0"/>
+          </a:p>
+        </p:txBody>
+      </p:sp>
+      <p:sp>
+        <p:nvSpPr>
+          <p:cNvPr id="6" name="Rectangle 5"/>
+          <p:cNvSpPr/>
+          <p:nvPr/>
+        </p:nvSpPr>
+        <p:spPr>
+          <a:xfrm>
+            <a:off x="4142063" y="1789609"/>
+            <a:ext cx="3983034" cy="3409405"/>
+          </a:xfrm>
+          <a:prstGeom prst="rect">
+            <a:avLst/>
+          </a:prstGeom>
+          <a:noFill/>
+          <a:ln>
+            <a:solidFill>
+              <a:schemeClr val="tx1"/>
+            </a:solidFill>
+          </a:ln>
+        </p:spPr>
+        <p:style>
+          <a:lnRef idx="2">
+            <a:schemeClr val="accent1">
+              <a:shade val="50000"/>
+            </a:schemeClr>
+          </a:lnRef>
+          <a:fillRef idx="1">
+            <a:schemeClr val="accent1"/>
+          </a:fillRef>
+          <a:effectRef idx="0">
+            <a:schemeClr val="accent1"/>
+          </a:effectRef>
+          <a:fontRef idx="minor">
+            <a:schemeClr val="lt1"/>
+          </a:fontRef>
+        </p:style>
+        <p:txBody>
+          <a:bodyPr rtlCol="0" anchor="ctr"/>
+          <a:lstStyle/>
+          <a:p>
+            <a:pPr algn="ctr"/>
+            <a:endParaRPr lang="en-US" dirty="0"/>
+          </a:p>
+        </p:txBody>
+      </p:sp>
+      <p:sp>
+        <p:nvSpPr>
+          <p:cNvPr id="7" name="Rectangle 6"/>
+          <p:cNvSpPr/>
+          <p:nvPr/>
+        </p:nvSpPr>
+        <p:spPr>
+          <a:xfrm>
+            <a:off x="8123802" y="2862549"/>
+            <a:ext cx="3487783" cy="1285874"/>
+          </a:xfrm>
+          <a:prstGeom prst="rect">
+            <a:avLst/>
+          </a:prstGeom>
+          <a:noFill/>
+          <a:ln>
+            <a:solidFill>
+              <a:schemeClr val="tx1"/>
+            </a:solidFill>
+          </a:ln>
+        </p:spPr>
+        <p:style>
+          <a:lnRef idx="2">
+            <a:schemeClr val="accent1">
+              <a:shade val="50000"/>
+            </a:schemeClr>
+          </a:lnRef>
+          <a:fillRef idx="1">
+            <a:schemeClr val="accent1"/>
+          </a:fillRef>
+          <a:effectRef idx="0">
+            <a:schemeClr val="accent1"/>
+          </a:effectRef>
+          <a:fontRef idx="minor">
+            <a:schemeClr val="lt1"/>
+          </a:fontRef>
+        </p:style>
+        <p:txBody>
+          <a:bodyPr rtlCol="0" anchor="ctr"/>
+          <a:lstStyle/>
+          <a:p>
+            <a:pPr algn="ctr"/>
+            <a:r>
+              <a:rPr lang="en-US" dirty="0" smtClean="0">
+                <a:solidFill>
+                  <a:schemeClr val="tx1"/>
+                </a:solidFill>
+              </a:rPr>
+              <a:t>View</a:t>
+            </a:r>
+            <a:endParaRPr lang="en-US" dirty="0">
+              <a:solidFill>
+                <a:schemeClr val="tx1"/>
+              </a:solidFill>
+            </a:endParaRPr>
+          </a:p>
+        </p:txBody>
+      </p:sp>
+      <p:cxnSp>
+        <p:nvCxnSpPr>
+          <p:cNvPr id="8" name="Straight Connector 7"/>
+          <p:cNvCxnSpPr>
+            <a:stCxn id="5" idx="3"/>
+            <a:endCxn id="6" idx="1"/>
+          </p:cNvCxnSpPr>
+          <p:nvPr/>
+        </p:nvCxnSpPr>
+        <p:spPr>
+          <a:xfrm flipV="1">
+            <a:off x="3613537" y="3494312"/>
+            <a:ext cx="528526" cy="1"/>
+          </a:xfrm>
+          <a:prstGeom prst="line">
+            <a:avLst/>
+          </a:prstGeom>
+          <a:ln>
+            <a:solidFill>
+              <a:schemeClr val="tx1"/>
+            </a:solidFill>
+          </a:ln>
+        </p:spPr>
+        <p:style>
+          <a:lnRef idx="1">
+            <a:schemeClr val="accent1"/>
+          </a:lnRef>
+          <a:fillRef idx="0">
+            <a:schemeClr val="accent1"/>
+          </a:fillRef>
+          <a:effectRef idx="0">
+            <a:schemeClr val="accent1"/>
+          </a:effectRef>
+          <a:fontRef idx="minor">
+            <a:schemeClr val="tx1"/>
+          </a:fontRef>
+        </p:style>
+      </p:cxnSp>
+      <p:sp>
+        <p:nvSpPr>
+          <p:cNvPr id="9" name="TextBox 8"/>
+          <p:cNvSpPr txBox="1"/>
+          <p:nvPr/>
+        </p:nvSpPr>
+        <p:spPr>
+          <a:xfrm>
+            <a:off x="8489798" y="988077"/>
+            <a:ext cx="2545491" cy="369332"/>
+          </a:xfrm>
+          <a:prstGeom prst="rect">
+            <a:avLst/>
+          </a:prstGeom>
+          <a:noFill/>
+        </p:spPr>
+        <p:txBody>
+          <a:bodyPr wrap="square" rtlCol="0">
+            <a:spAutoFit/>
+          </a:bodyPr>
+          <a:lstStyle/>
+          <a:p>
+            <a:pPr algn="ctr"/>
+            <a:r>
+              <a:rPr lang="en-US" dirty="0" smtClean="0"/>
+              <a:t>Application Layer</a:t>
+            </a:r>
+            <a:endParaRPr lang="en-US" dirty="0"/>
+          </a:p>
+        </p:txBody>
+      </p:sp>
+      <p:sp>
+        <p:nvSpPr>
+          <p:cNvPr id="10" name="TextBox 9"/>
+          <p:cNvSpPr txBox="1"/>
+          <p:nvPr/>
+        </p:nvSpPr>
+        <p:spPr>
+          <a:xfrm>
+            <a:off x="4860834" y="979223"/>
+            <a:ext cx="2545491" cy="369332"/>
+          </a:xfrm>
+          <a:prstGeom prst="rect">
+            <a:avLst/>
+          </a:prstGeom>
+          <a:noFill/>
+        </p:spPr>
+        <p:txBody>
+          <a:bodyPr wrap="square" rtlCol="0">
+            <a:spAutoFit/>
+          </a:bodyPr>
+          <a:lstStyle/>
+          <a:p>
+            <a:pPr algn="ctr"/>
+            <a:r>
+              <a:rPr lang="en-US" dirty="0" smtClean="0"/>
+              <a:t>Business Layer</a:t>
+            </a:r>
+            <a:endParaRPr lang="en-US" dirty="0"/>
+          </a:p>
+        </p:txBody>
+      </p:sp>
+      <p:sp>
+        <p:nvSpPr>
+          <p:cNvPr id="11" name="TextBox 10"/>
+          <p:cNvSpPr txBox="1"/>
+          <p:nvPr/>
+        </p:nvSpPr>
+        <p:spPr>
+          <a:xfrm>
+            <a:off x="841850" y="972100"/>
+            <a:ext cx="2545491" cy="369332"/>
+          </a:xfrm>
+          <a:prstGeom prst="rect">
+            <a:avLst/>
+          </a:prstGeom>
+          <a:noFill/>
+        </p:spPr>
+        <p:txBody>
+          <a:bodyPr wrap="square" rtlCol="0">
+            <a:spAutoFit/>
+          </a:bodyPr>
+          <a:lstStyle/>
+          <a:p>
+            <a:pPr algn="ctr"/>
+            <a:r>
+              <a:rPr lang="en-US" dirty="0" smtClean="0"/>
+              <a:t>Data Layer</a:t>
+            </a:r>
+            <a:endParaRPr lang="en-US" dirty="0"/>
+          </a:p>
+        </p:txBody>
+      </p:sp>
+      <p:sp>
+        <p:nvSpPr>
+          <p:cNvPr id="26" name="TextBox 25"/>
+          <p:cNvSpPr txBox="1"/>
+          <p:nvPr/>
+        </p:nvSpPr>
+        <p:spPr>
+          <a:xfrm>
+            <a:off x="5371993" y="1932593"/>
+            <a:ext cx="1523174" cy="369332"/>
+          </a:xfrm>
+          <a:prstGeom prst="rect">
+            <a:avLst/>
+          </a:prstGeom>
+          <a:noFill/>
+        </p:spPr>
+        <p:txBody>
+          <a:bodyPr wrap="none" rtlCol="0">
+            <a:spAutoFit/>
+          </a:bodyPr>
+          <a:lstStyle/>
+          <a:p>
+            <a:r>
+              <a:rPr lang="en-US" smtClean="0"/>
+              <a:t>Business Logic</a:t>
+            </a:r>
+            <a:endParaRPr lang="en-US"/>
+          </a:p>
+        </p:txBody>
+      </p:sp>
+      <p:sp>
+        <p:nvSpPr>
+          <p:cNvPr id="27" name="Rectangle 26"/>
+          <p:cNvSpPr/>
+          <p:nvPr/>
+        </p:nvSpPr>
+        <p:spPr>
+          <a:xfrm>
+            <a:off x="4866136" y="2508781"/>
+            <a:ext cx="1161622" cy="707537"/>
+          </a:xfrm>
+          <a:prstGeom prst="rect">
+            <a:avLst/>
+          </a:prstGeom>
+          <a:noFill/>
+          <a:ln>
+            <a:solidFill>
+              <a:schemeClr val="tx1"/>
+            </a:solidFill>
+          </a:ln>
+        </p:spPr>
+        <p:style>
+          <a:lnRef idx="2">
+            <a:schemeClr val="accent1">
+              <a:shade val="50000"/>
+            </a:schemeClr>
+          </a:lnRef>
+          <a:fillRef idx="1">
+            <a:schemeClr val="accent1"/>
+          </a:fillRef>
+          <a:effectRef idx="0">
+            <a:schemeClr val="accent1"/>
+          </a:effectRef>
+          <a:fontRef idx="minor">
+            <a:schemeClr val="lt1"/>
+          </a:fontRef>
+        </p:style>
+        <p:txBody>
+          <a:bodyPr rtlCol="0" anchor="ctr"/>
+          <a:lstStyle/>
+          <a:p>
+            <a:pPr algn="ctr"/>
+            <a:r>
+              <a:rPr lang="en-US" smtClean="0">
+                <a:solidFill>
+                  <a:schemeClr val="tx1"/>
+                </a:solidFill>
+              </a:rPr>
+              <a:t>Module 1</a:t>
+            </a:r>
+            <a:endParaRPr lang="en-US" dirty="0"/>
+          </a:p>
+        </p:txBody>
+      </p:sp>
+      <p:sp>
+        <p:nvSpPr>
+          <p:cNvPr id="28" name="Rectangle 27"/>
+          <p:cNvSpPr/>
+          <p:nvPr/>
+        </p:nvSpPr>
+        <p:spPr>
+          <a:xfrm>
+            <a:off x="6009488" y="3355316"/>
+            <a:ext cx="1161622" cy="707537"/>
+          </a:xfrm>
+          <a:prstGeom prst="rect">
+            <a:avLst/>
+          </a:prstGeom>
+          <a:noFill/>
+          <a:ln>
+            <a:solidFill>
+              <a:schemeClr val="tx1"/>
+            </a:solidFill>
+          </a:ln>
+        </p:spPr>
+        <p:style>
+          <a:lnRef idx="2">
+            <a:schemeClr val="accent1">
+              <a:shade val="50000"/>
+            </a:schemeClr>
+          </a:lnRef>
+          <a:fillRef idx="1">
+            <a:schemeClr val="accent1"/>
+          </a:fillRef>
+          <a:effectRef idx="0">
+            <a:schemeClr val="accent1"/>
+          </a:effectRef>
+          <a:fontRef idx="minor">
+            <a:schemeClr val="lt1"/>
+          </a:fontRef>
+        </p:style>
+        <p:txBody>
+          <a:bodyPr rtlCol="0" anchor="ctr"/>
+          <a:lstStyle/>
+          <a:p>
+            <a:pPr algn="ctr"/>
+            <a:r>
+              <a:rPr lang="en-US" dirty="0" smtClean="0">
+                <a:solidFill>
+                  <a:schemeClr val="tx1"/>
+                </a:solidFill>
+              </a:rPr>
+              <a:t>Module 2</a:t>
+            </a:r>
+            <a:endParaRPr lang="en-US" dirty="0"/>
+          </a:p>
+        </p:txBody>
+      </p:sp>
+      <p:sp>
+        <p:nvSpPr>
+          <p:cNvPr id="29" name="Rectangle 28"/>
+          <p:cNvSpPr/>
+          <p:nvPr/>
+        </p:nvSpPr>
+        <p:spPr>
+          <a:xfrm>
+            <a:off x="5176982" y="4364909"/>
+            <a:ext cx="1161622" cy="707537"/>
+          </a:xfrm>
+          <a:prstGeom prst="rect">
+            <a:avLst/>
+          </a:prstGeom>
+          <a:noFill/>
+          <a:ln>
+            <a:solidFill>
+              <a:schemeClr val="tx1"/>
+            </a:solidFill>
+          </a:ln>
+        </p:spPr>
+        <p:style>
+          <a:lnRef idx="2">
+            <a:schemeClr val="accent1">
+              <a:shade val="50000"/>
+            </a:schemeClr>
+          </a:lnRef>
+          <a:fillRef idx="1">
+            <a:schemeClr val="accent1"/>
+          </a:fillRef>
+          <a:effectRef idx="0">
+            <a:schemeClr val="accent1"/>
+          </a:effectRef>
+          <a:fontRef idx="minor">
+            <a:schemeClr val="lt1"/>
+          </a:fontRef>
+        </p:style>
+        <p:txBody>
+          <a:bodyPr rtlCol="0" anchor="ctr"/>
+          <a:lstStyle/>
+          <a:p>
+            <a:pPr algn="ctr"/>
+            <a:r>
+              <a:rPr lang="en-US" dirty="0" smtClean="0">
+                <a:solidFill>
+                  <a:schemeClr val="tx1"/>
+                </a:solidFill>
+              </a:rPr>
+              <a:t>Module 3</a:t>
+            </a:r>
+            <a:endParaRPr lang="en-US" dirty="0"/>
+          </a:p>
+        </p:txBody>
+      </p:sp>
+      <p:cxnSp>
+        <p:nvCxnSpPr>
+          <p:cNvPr id="31" name="Elbow Connector 30"/>
+          <p:cNvCxnSpPr>
+            <a:endCxn id="28" idx="0"/>
+          </p:cNvCxnSpPr>
+          <p:nvPr/>
+        </p:nvCxnSpPr>
+        <p:spPr>
+          <a:xfrm>
+            <a:off x="6016451" y="3004900"/>
+            <a:ext cx="573848" cy="350416"/>
+          </a:xfrm>
+          <a:prstGeom prst="bentConnector2">
+            <a:avLst/>
+          </a:prstGeom>
+          <a:ln>
+            <a:solidFill>
+              <a:schemeClr val="tx1"/>
+            </a:solidFill>
+            <a:tailEnd type="triangle"/>
+          </a:ln>
+        </p:spPr>
+        <p:style>
+          <a:lnRef idx="1">
+            <a:schemeClr val="accent1"/>
+          </a:lnRef>
+          <a:fillRef idx="0">
+            <a:schemeClr val="accent1"/>
+          </a:fillRef>
+          <a:effectRef idx="0">
+            <a:schemeClr val="accent1"/>
+          </a:effectRef>
+          <a:fontRef idx="minor">
+            <a:schemeClr val="tx1"/>
+          </a:fontRef>
+        </p:style>
+      </p:cxnSp>
+      <p:cxnSp>
+        <p:nvCxnSpPr>
+          <p:cNvPr id="33" name="Elbow Connector 32"/>
+          <p:cNvCxnSpPr>
+            <a:stCxn id="27" idx="2"/>
+            <a:endCxn id="29" idx="0"/>
+          </p:cNvCxnSpPr>
+          <p:nvPr/>
+        </p:nvCxnSpPr>
+        <p:spPr>
+          <a:xfrm rot="16200000" flipH="1">
+            <a:off x="5028075" y="3635190"/>
+            <a:ext cx="1148591" cy="310846"/>
+          </a:xfrm>
+          <a:prstGeom prst="bentConnector3">
+            <a:avLst>
+              <a:gd name="adj1" fmla="val 50000"/>
+            </a:avLst>
+          </a:prstGeom>
+          <a:ln>
+            <a:solidFill>
+              <a:schemeClr val="tx1"/>
+            </a:solidFill>
+            <a:tailEnd type="triangle"/>
+          </a:ln>
+        </p:spPr>
+        <p:style>
+          <a:lnRef idx="1">
+            <a:schemeClr val="accent1"/>
+          </a:lnRef>
+          <a:fillRef idx="0">
+            <a:schemeClr val="accent1"/>
+          </a:fillRef>
+          <a:effectRef idx="0">
+            <a:schemeClr val="accent1"/>
+          </a:effectRef>
+          <a:fontRef idx="minor">
+            <a:schemeClr val="tx1"/>
+          </a:fontRef>
+        </p:style>
+      </p:cxnSp>
+      <p:cxnSp>
+        <p:nvCxnSpPr>
+          <p:cNvPr id="47" name="Elbow Connector 46"/>
+          <p:cNvCxnSpPr/>
+          <p:nvPr/>
+        </p:nvCxnSpPr>
+        <p:spPr>
+          <a:xfrm>
+            <a:off x="6020558" y="2855350"/>
+            <a:ext cx="2097339" cy="631762"/>
+          </a:xfrm>
+          <a:prstGeom prst="bentConnector3">
+            <a:avLst>
+              <a:gd name="adj1" fmla="val 69170"/>
+            </a:avLst>
+          </a:prstGeom>
+          <a:ln>
+            <a:solidFill>
+              <a:schemeClr val="tx1"/>
+            </a:solidFill>
+            <a:tailEnd type="triangle"/>
+          </a:ln>
+        </p:spPr>
+        <p:style>
+          <a:lnRef idx="1">
+            <a:schemeClr val="accent1"/>
+          </a:lnRef>
+          <a:fillRef idx="0">
+            <a:schemeClr val="accent1"/>
+          </a:fillRef>
+          <a:effectRef idx="0">
+            <a:schemeClr val="accent1"/>
+          </a:effectRef>
+          <a:fontRef idx="minor">
+            <a:schemeClr val="tx1"/>
+          </a:fontRef>
+        </p:style>
+      </p:cxnSp>
+      <p:cxnSp>
+        <p:nvCxnSpPr>
+          <p:cNvPr id="51" name="Elbow Connector 50"/>
+          <p:cNvCxnSpPr/>
+          <p:nvPr/>
+        </p:nvCxnSpPr>
+        <p:spPr>
+          <a:xfrm flipV="1">
+            <a:off x="7163910" y="3494312"/>
+            <a:ext cx="953987" cy="214773"/>
+          </a:xfrm>
+          <a:prstGeom prst="bentConnector3">
+            <a:avLst>
+              <a:gd name="adj1" fmla="val 32221"/>
+            </a:avLst>
+          </a:prstGeom>
+          <a:ln>
+            <a:solidFill>
+              <a:schemeClr val="tx1"/>
+            </a:solidFill>
+            <a:tailEnd type="triangle"/>
+          </a:ln>
+        </p:spPr>
+        <p:style>
+          <a:lnRef idx="1">
+            <a:schemeClr val="accent1"/>
+          </a:lnRef>
+          <a:fillRef idx="0">
+            <a:schemeClr val="accent1"/>
+          </a:fillRef>
+          <a:effectRef idx="0">
+            <a:schemeClr val="accent1"/>
+          </a:effectRef>
+          <a:fontRef idx="minor">
+            <a:schemeClr val="tx1"/>
+          </a:fontRef>
+        </p:style>
+      </p:cxnSp>
+      <p:cxnSp>
+        <p:nvCxnSpPr>
+          <p:cNvPr id="52" name="Elbow Connector 51"/>
+          <p:cNvCxnSpPr/>
+          <p:nvPr/>
+        </p:nvCxnSpPr>
+        <p:spPr>
+          <a:xfrm flipV="1">
+            <a:off x="6338604" y="3494312"/>
+            <a:ext cx="1786493" cy="1224366"/>
+          </a:xfrm>
+          <a:prstGeom prst="bentConnector3">
+            <a:avLst>
+              <a:gd name="adj1" fmla="val 63551"/>
+            </a:avLst>
+          </a:prstGeom>
+          <a:ln>
+            <a:solidFill>
+              <a:schemeClr val="tx1"/>
+            </a:solidFill>
+            <a:tailEnd type="triangle"/>
+          </a:ln>
+        </p:spPr>
+        <p:style>
+          <a:lnRef idx="1">
+            <a:schemeClr val="accent1"/>
+          </a:lnRef>
+          <a:fillRef idx="0">
+            <a:schemeClr val="accent1"/>
+          </a:fillRef>
+          <a:effectRef idx="0">
+            <a:schemeClr val="accent1"/>
+          </a:effectRef>
+          <a:fontRef idx="minor">
+            <a:schemeClr val="tx1"/>
+          </a:fontRef>
+        </p:style>
+      </p:cxnSp>
+      <p:pic>
+        <p:nvPicPr>
+          <p:cNvPr id="70" name="Picture 69"/>
+          <p:cNvPicPr>
+            <a:picLocks noChangeAspect="1"/>
+          </p:cNvPicPr>
+          <p:nvPr/>
+        </p:nvPicPr>
+        <p:blipFill>
+          <a:blip r:embed="rId2"/>
+          <a:stretch>
+            <a:fillRect/>
+          </a:stretch>
+        </p:blipFill>
+        <p:spPr>
+          <a:xfrm>
+            <a:off x="5474773" y="3657372"/>
+            <a:ext cx="236925" cy="236925"/>
+          </a:xfrm>
+          <a:prstGeom prst="rect">
+            <a:avLst/>
+          </a:prstGeom>
+          <a:solidFill>
+            <a:schemeClr val="bg1"/>
+          </a:solidFill>
+        </p:spPr>
+      </p:pic>
+      <p:pic>
+        <p:nvPicPr>
+          <p:cNvPr id="72" name="Picture 71"/>
+          <p:cNvPicPr>
+            <a:picLocks noChangeAspect="1"/>
+          </p:cNvPicPr>
+          <p:nvPr/>
+        </p:nvPicPr>
+        <p:blipFill>
+          <a:blip r:embed="rId2"/>
+          <a:stretch>
+            <a:fillRect/>
+          </a:stretch>
+        </p:blipFill>
+        <p:spPr>
+          <a:xfrm>
+            <a:off x="6167433" y="2892195"/>
+            <a:ext cx="236925" cy="236925"/>
+          </a:xfrm>
+          <a:prstGeom prst="rect">
+            <a:avLst/>
+          </a:prstGeom>
+          <a:solidFill>
+            <a:schemeClr val="bg1"/>
+          </a:solidFill>
+        </p:spPr>
+      </p:pic>
+      <p:pic>
+        <p:nvPicPr>
+          <p:cNvPr id="73" name="Picture 72"/>
+          <p:cNvPicPr>
+            <a:picLocks noChangeAspect="1"/>
+          </p:cNvPicPr>
+          <p:nvPr/>
+        </p:nvPicPr>
+        <p:blipFill>
+          <a:blip r:embed="rId2"/>
+          <a:stretch>
+            <a:fillRect/>
+          </a:stretch>
+        </p:blipFill>
+        <p:spPr>
+          <a:xfrm>
+            <a:off x="262958" y="5801872"/>
+            <a:ext cx="236925" cy="236925"/>
+          </a:xfrm>
+          <a:prstGeom prst="rect">
+            <a:avLst/>
+          </a:prstGeom>
+          <a:solidFill>
+            <a:schemeClr val="bg1"/>
+          </a:solidFill>
+        </p:spPr>
+      </p:pic>
+      <p:sp>
+        <p:nvSpPr>
+          <p:cNvPr id="74" name="TextBox 73"/>
+          <p:cNvSpPr txBox="1"/>
+          <p:nvPr/>
+        </p:nvSpPr>
+        <p:spPr>
+          <a:xfrm>
+            <a:off x="527527" y="5735668"/>
+            <a:ext cx="2445636" cy="369332"/>
+          </a:xfrm>
+          <a:prstGeom prst="rect">
+            <a:avLst/>
+          </a:prstGeom>
+          <a:noFill/>
+        </p:spPr>
+        <p:txBody>
+          <a:bodyPr wrap="square" rtlCol="0">
+            <a:spAutoFit/>
+          </a:bodyPr>
+          <a:lstStyle/>
+          <a:p>
+            <a:r>
+              <a:rPr lang="en-US" smtClean="0"/>
+              <a:t>Dependent </a:t>
+            </a:r>
+            <a:r>
+              <a:rPr lang="en-US" dirty="0" smtClean="0"/>
+              <a:t>on</a:t>
+            </a:r>
+            <a:endParaRPr lang="en-US" dirty="0"/>
+          </a:p>
+        </p:txBody>
+      </p:sp>
+      <p:sp>
+        <p:nvSpPr>
+          <p:cNvPr id="75" name="TextBox 74"/>
+          <p:cNvSpPr txBox="1"/>
+          <p:nvPr/>
+        </p:nvSpPr>
+        <p:spPr>
+          <a:xfrm>
+            <a:off x="185057" y="5432540"/>
+            <a:ext cx="2427515" cy="369332"/>
+          </a:xfrm>
+          <a:prstGeom prst="rect">
+            <a:avLst/>
+          </a:prstGeom>
+          <a:noFill/>
+        </p:spPr>
+        <p:txBody>
+          <a:bodyPr wrap="square" rtlCol="0">
+            <a:spAutoFit/>
+          </a:bodyPr>
+          <a:lstStyle/>
+          <a:p>
+            <a:r>
+              <a:rPr lang="en-US" smtClean="0"/>
+              <a:t>Legend:</a:t>
+            </a:r>
+            <a:endParaRPr lang="en-US" dirty="0"/>
+          </a:p>
+        </p:txBody>
+      </p:sp>
+      <p:cxnSp>
+        <p:nvCxnSpPr>
+          <p:cNvPr id="77" name="Elbow Connector 76"/>
+          <p:cNvCxnSpPr>
+            <a:endCxn id="28" idx="2"/>
+          </p:cNvCxnSpPr>
+          <p:nvPr/>
+        </p:nvCxnSpPr>
+        <p:spPr>
+          <a:xfrm rot="5400000" flipH="1" flipV="1">
+            <a:off x="6227985" y="4173473"/>
+            <a:ext cx="472933" cy="251695"/>
+          </a:xfrm>
+          <a:prstGeom prst="bentConnector3">
+            <a:avLst>
+              <a:gd name="adj1" fmla="val 7885"/>
+            </a:avLst>
+          </a:prstGeom>
+          <a:ln>
+            <a:solidFill>
+              <a:schemeClr val="tx1"/>
+            </a:solidFill>
+            <a:tailEnd type="triangle"/>
+          </a:ln>
+        </p:spPr>
+        <p:style>
+          <a:lnRef idx="1">
+            <a:schemeClr val="accent1"/>
+          </a:lnRef>
+          <a:fillRef idx="0">
+            <a:schemeClr val="accent1"/>
+          </a:fillRef>
+          <a:effectRef idx="0">
+            <a:schemeClr val="accent1"/>
+          </a:effectRef>
+          <a:fontRef idx="minor">
+            <a:schemeClr val="tx1"/>
+          </a:fontRef>
+        </p:style>
+      </p:cxnSp>
+      <p:pic>
+        <p:nvPicPr>
+          <p:cNvPr id="80" name="Picture 79"/>
+          <p:cNvPicPr>
+            <a:picLocks noChangeAspect="1"/>
+          </p:cNvPicPr>
+          <p:nvPr/>
+        </p:nvPicPr>
+        <p:blipFill>
+          <a:blip r:embed="rId2"/>
+          <a:stretch>
+            <a:fillRect/>
+          </a:stretch>
+        </p:blipFill>
+        <p:spPr>
+          <a:xfrm>
+            <a:off x="6463231" y="4363290"/>
+            <a:ext cx="236925" cy="236925"/>
+          </a:xfrm>
+          <a:prstGeom prst="rect">
+            <a:avLst/>
+          </a:prstGeom>
+          <a:solidFill>
+            <a:schemeClr val="bg1"/>
+          </a:solidFill>
+        </p:spPr>
+      </p:pic>
+    </p:spTree>
+    <p:extLst>
+      <p:ext uri="{BB962C8B-B14F-4D97-AF65-F5344CB8AC3E}">
+        <p14:creationId xmlns:p14="http://schemas.microsoft.com/office/powerpoint/2010/main" val="451044249"/>
+      </p:ext>
+    </p:extLst>
+  </p:cSld>
+  <p:clrMapOvr>
+    <a:masterClrMapping/>
+  </p:clrMapOvr>
+</p:sld>
+</file>
+
+<file path=ppt/slides/slide3.xml><?xml version="1.0" encoding="utf-8"?>
+<p:sld xmlns:a="http://schemas.openxmlformats.org/drawingml/2006/main" xmlns:r="http://schemas.openxmlformats.org/officeDocument/2006/relationships" xmlns:p="http://schemas.openxmlformats.org/presentationml/2006/main">
+  <p:cSld>
+    <p:spTree>
+      <p:nvGrpSpPr>
+        <p:cNvPr id="1" name=""/>
+        <p:cNvGrpSpPr/>
+        <p:nvPr/>
+      </p:nvGrpSpPr>
+      <p:grpSpPr>
+        <a:xfrm>
+          <a:off x="0" y="0"/>
+          <a:ext cx="0" cy="0"/>
+          <a:chOff x="0" y="0"/>
+          <a:chExt cx="0" cy="0"/>
+        </a:xfrm>
+      </p:grpSpPr>
+      <p:sp>
+        <p:nvSpPr>
+          <p:cNvPr id="5" name="Rectangle 4"/>
+          <p:cNvSpPr/>
+          <p:nvPr/>
+        </p:nvSpPr>
+        <p:spPr>
+          <a:xfrm>
+            <a:off x="8627628" y="1075653"/>
+            <a:ext cx="1993753" cy="1767210"/>
+          </a:xfrm>
+          <a:prstGeom prst="rect">
+            <a:avLst/>
+          </a:prstGeom>
+          <a:noFill/>
+          <a:ln>
+            <a:solidFill>
+              <a:schemeClr val="tx1"/>
+            </a:solidFill>
+          </a:ln>
+        </p:spPr>
+        <p:style>
+          <a:lnRef idx="2">
+            <a:schemeClr val="accent1">
+              <a:shade val="50000"/>
+            </a:schemeClr>
+          </a:lnRef>
+          <a:fillRef idx="1">
+            <a:schemeClr val="accent1"/>
+          </a:fillRef>
+          <a:effectRef idx="0">
+            <a:schemeClr val="accent1"/>
+          </a:effectRef>
+          <a:fontRef idx="minor">
+            <a:schemeClr val="lt1"/>
+          </a:fontRef>
+        </p:style>
+        <p:txBody>
+          <a:bodyPr rtlCol="0" anchor="ctr"/>
+          <a:lstStyle/>
+          <a:p>
+            <a:pPr algn="ctr"/>
+            <a:r>
+              <a:rPr lang="en-US" dirty="0" smtClean="0">
+                <a:solidFill>
+                  <a:schemeClr val="tx1"/>
+                </a:solidFill>
+              </a:rPr>
+              <a:t>Calculator</a:t>
+            </a:r>
+            <a:endParaRPr lang="en-US" dirty="0">
+              <a:solidFill>
+                <a:schemeClr val="tx1"/>
+              </a:solidFill>
+            </a:endParaRPr>
+          </a:p>
+        </p:txBody>
+      </p:sp>
+      <p:sp>
+        <p:nvSpPr>
+          <p:cNvPr id="7" name="Rectangle 6"/>
+          <p:cNvSpPr/>
+          <p:nvPr/>
+        </p:nvSpPr>
+        <p:spPr>
+          <a:xfrm>
+            <a:off x="5044169" y="1087729"/>
+            <a:ext cx="1977134" cy="1755134"/>
+          </a:xfrm>
+          <a:prstGeom prst="rect">
+            <a:avLst/>
+          </a:prstGeom>
+          <a:noFill/>
+          <a:ln>
+            <a:solidFill>
+              <a:schemeClr val="tx1"/>
+            </a:solidFill>
+          </a:ln>
+        </p:spPr>
+        <p:style>
+          <a:lnRef idx="2">
+            <a:schemeClr val="accent1">
+              <a:shade val="50000"/>
+            </a:schemeClr>
+          </a:lnRef>
+          <a:fillRef idx="1">
+            <a:schemeClr val="accent1"/>
+          </a:fillRef>
+          <a:effectRef idx="0">
+            <a:schemeClr val="accent1"/>
+          </a:effectRef>
+          <a:fontRef idx="minor">
+            <a:schemeClr val="lt1"/>
+          </a:fontRef>
+        </p:style>
+        <p:txBody>
+          <a:bodyPr rtlCol="0" anchor="ctr"/>
+          <a:lstStyle/>
+          <a:p>
+            <a:pPr algn="ctr"/>
+            <a:r>
+              <a:rPr lang="en-US" dirty="0" smtClean="0">
+                <a:solidFill>
+                  <a:schemeClr val="tx1"/>
+                </a:solidFill>
+              </a:rPr>
+              <a:t>Plotter</a:t>
+            </a:r>
+            <a:endParaRPr lang="en-US" dirty="0">
+              <a:solidFill>
+                <a:schemeClr val="tx1"/>
+              </a:solidFill>
+            </a:endParaRPr>
+          </a:p>
+        </p:txBody>
+      </p:sp>
+      <p:sp>
+        <p:nvSpPr>
+          <p:cNvPr id="8" name="Rectangle 7"/>
+          <p:cNvSpPr/>
+          <p:nvPr/>
+        </p:nvSpPr>
+        <p:spPr>
+          <a:xfrm>
+            <a:off x="5044169" y="3584171"/>
+            <a:ext cx="1977134" cy="1755609"/>
+          </a:xfrm>
+          <a:prstGeom prst="rect">
+            <a:avLst/>
+          </a:prstGeom>
+          <a:noFill/>
+          <a:ln>
+            <a:solidFill>
+              <a:schemeClr val="tx1"/>
+            </a:solidFill>
+          </a:ln>
+        </p:spPr>
+        <p:style>
+          <a:lnRef idx="2">
+            <a:schemeClr val="accent1">
+              <a:shade val="50000"/>
+            </a:schemeClr>
+          </a:lnRef>
+          <a:fillRef idx="1">
+            <a:schemeClr val="accent1"/>
+          </a:fillRef>
+          <a:effectRef idx="0">
+            <a:schemeClr val="accent1"/>
+          </a:effectRef>
+          <a:fontRef idx="minor">
+            <a:schemeClr val="lt1"/>
+          </a:fontRef>
+        </p:style>
+        <p:txBody>
+          <a:bodyPr rtlCol="0" anchor="ctr"/>
+          <a:lstStyle/>
+          <a:p>
+            <a:pPr algn="ctr"/>
+            <a:r>
+              <a:rPr lang="en-US" dirty="0" smtClean="0">
+                <a:solidFill>
+                  <a:schemeClr val="tx1"/>
+                </a:solidFill>
+              </a:rPr>
+              <a:t>Displayer</a:t>
+            </a:r>
+            <a:endParaRPr lang="en-US" dirty="0">
+              <a:solidFill>
+                <a:schemeClr val="tx1"/>
+              </a:solidFill>
+            </a:endParaRPr>
+          </a:p>
+        </p:txBody>
+      </p:sp>
+      <p:pic>
+        <p:nvPicPr>
+          <p:cNvPr id="24" name="Picture 23"/>
+          <p:cNvPicPr>
+            <a:picLocks noChangeAspect="1"/>
+          </p:cNvPicPr>
+          <p:nvPr/>
+        </p:nvPicPr>
+        <p:blipFill>
+          <a:blip r:embed="rId2"/>
+          <a:stretch>
+            <a:fillRect/>
+          </a:stretch>
+        </p:blipFill>
+        <p:spPr>
+          <a:xfrm>
+            <a:off x="1453342" y="1438462"/>
+            <a:ext cx="1053668" cy="1053668"/>
+          </a:xfrm>
+          <a:prstGeom prst="rect">
+            <a:avLst/>
+          </a:prstGeom>
+        </p:spPr>
+      </p:pic>
+      <p:sp>
+        <p:nvSpPr>
+          <p:cNvPr id="25" name="TextBox 24"/>
+          <p:cNvSpPr txBox="1"/>
+          <p:nvPr/>
+        </p:nvSpPr>
+        <p:spPr>
+          <a:xfrm>
+            <a:off x="3050416" y="1330814"/>
+            <a:ext cx="1262679" cy="369332"/>
+          </a:xfrm>
+          <a:prstGeom prst="rect">
+            <a:avLst/>
+          </a:prstGeom>
+          <a:noFill/>
+        </p:spPr>
+        <p:txBody>
+          <a:bodyPr wrap="square" rtlCol="0">
+            <a:spAutoFit/>
+          </a:bodyPr>
+          <a:lstStyle/>
+          <a:p>
+            <a:pPr algn="ctr"/>
+            <a:r>
+              <a:rPr lang="en-US" dirty="0" smtClean="0"/>
+              <a:t>User Input</a:t>
+            </a:r>
+            <a:endParaRPr lang="en-US" dirty="0"/>
+          </a:p>
+        </p:txBody>
+      </p:sp>
+      <p:sp>
+        <p:nvSpPr>
+          <p:cNvPr id="26" name="Right Arrow 25"/>
+          <p:cNvSpPr/>
+          <p:nvPr/>
+        </p:nvSpPr>
+        <p:spPr>
+          <a:xfrm>
+            <a:off x="3272100" y="1919500"/>
+            <a:ext cx="693682" cy="283780"/>
+          </a:xfrm>
+          <a:prstGeom prst="rightArrow">
+            <a:avLst/>
+          </a:prstGeom>
+          <a:noFill/>
+          <a:ln>
+            <a:solidFill>
+              <a:schemeClr val="tx1"/>
+            </a:solidFill>
+          </a:ln>
+        </p:spPr>
+        <p:style>
+          <a:lnRef idx="2">
+            <a:schemeClr val="accent1">
+              <a:shade val="50000"/>
+            </a:schemeClr>
+          </a:lnRef>
+          <a:fillRef idx="1">
+            <a:schemeClr val="accent1"/>
+          </a:fillRef>
+          <a:effectRef idx="0">
+            <a:schemeClr val="accent1"/>
+          </a:effectRef>
+          <a:fontRef idx="minor">
+            <a:schemeClr val="lt1"/>
+          </a:fontRef>
+        </p:style>
+        <p:txBody>
+          <a:bodyPr rtlCol="0" anchor="ctr"/>
+          <a:lstStyle/>
+          <a:p>
+            <a:pPr algn="ctr"/>
+            <a:endParaRPr lang="en-US"/>
+          </a:p>
+        </p:txBody>
+      </p:sp>
+      <p:cxnSp>
+        <p:nvCxnSpPr>
+          <p:cNvPr id="31" name="Straight Arrow Connector 30"/>
+          <p:cNvCxnSpPr>
+            <a:stCxn id="7" idx="3"/>
+            <a:endCxn id="5" idx="1"/>
+          </p:cNvCxnSpPr>
+          <p:nvPr/>
+        </p:nvCxnSpPr>
+        <p:spPr>
+          <a:xfrm flipV="1">
+            <a:off x="7021303" y="1959258"/>
+            <a:ext cx="1606325" cy="6038"/>
+          </a:xfrm>
+          <a:prstGeom prst="straightConnector1">
+            <a:avLst/>
+          </a:prstGeom>
+          <a:ln>
+            <a:solidFill>
+              <a:schemeClr val="tx1"/>
+            </a:solidFill>
+            <a:tailEnd type="triangle"/>
+          </a:ln>
+        </p:spPr>
+        <p:style>
+          <a:lnRef idx="1">
+            <a:schemeClr val="accent1"/>
+          </a:lnRef>
+          <a:fillRef idx="0">
+            <a:schemeClr val="accent1"/>
+          </a:fillRef>
+          <a:effectRef idx="0">
+            <a:schemeClr val="accent1"/>
+          </a:effectRef>
+          <a:fontRef idx="minor">
+            <a:schemeClr val="tx1"/>
+          </a:fontRef>
+        </p:style>
+      </p:cxnSp>
+      <p:cxnSp>
+        <p:nvCxnSpPr>
+          <p:cNvPr id="34" name="Straight Arrow Connector 33"/>
+          <p:cNvCxnSpPr>
+            <a:stCxn id="7" idx="2"/>
+            <a:endCxn id="8" idx="0"/>
+          </p:cNvCxnSpPr>
+          <p:nvPr/>
+        </p:nvCxnSpPr>
+        <p:spPr>
+          <a:xfrm>
+            <a:off x="6032736" y="2842863"/>
+            <a:ext cx="0" cy="741308"/>
+          </a:xfrm>
+          <a:prstGeom prst="straightConnector1">
+            <a:avLst/>
+          </a:prstGeom>
+          <a:ln>
+            <a:solidFill>
+              <a:schemeClr val="tx1"/>
+            </a:solidFill>
+            <a:tailEnd type="triangle"/>
+          </a:ln>
+        </p:spPr>
+        <p:style>
+          <a:lnRef idx="1">
+            <a:schemeClr val="accent1"/>
+          </a:lnRef>
+          <a:fillRef idx="0">
+            <a:schemeClr val="accent1"/>
+          </a:fillRef>
+          <a:effectRef idx="0">
+            <a:schemeClr val="accent1"/>
+          </a:effectRef>
+          <a:fontRef idx="minor">
+            <a:schemeClr val="tx1"/>
+          </a:fontRef>
+        </p:style>
+      </p:cxnSp>
+      <p:cxnSp>
+        <p:nvCxnSpPr>
+          <p:cNvPr id="39" name="Straight Arrow Connector 38"/>
+          <p:cNvCxnSpPr/>
+          <p:nvPr/>
+        </p:nvCxnSpPr>
+        <p:spPr>
+          <a:xfrm flipH="1">
+            <a:off x="7021304" y="2492130"/>
+            <a:ext cx="1606324" cy="0"/>
+          </a:xfrm>
+          <a:prstGeom prst="straightConnector1">
+            <a:avLst/>
+          </a:prstGeom>
+          <a:ln>
+            <a:solidFill>
+              <a:schemeClr val="tx1"/>
+            </a:solidFill>
+            <a:tailEnd type="triangle"/>
+          </a:ln>
+        </p:spPr>
+        <p:style>
+          <a:lnRef idx="1">
+            <a:schemeClr val="accent1"/>
+          </a:lnRef>
+          <a:fillRef idx="0">
+            <a:schemeClr val="accent1"/>
+          </a:fillRef>
+          <a:effectRef idx="0">
+            <a:schemeClr val="accent1"/>
+          </a:effectRef>
+          <a:fontRef idx="minor">
+            <a:schemeClr val="tx1"/>
+          </a:fontRef>
+        </p:style>
+      </p:cxnSp>
+      <p:sp>
+        <p:nvSpPr>
+          <p:cNvPr id="40" name="TextBox 39"/>
+          <p:cNvSpPr txBox="1"/>
+          <p:nvPr/>
+        </p:nvSpPr>
+        <p:spPr>
+          <a:xfrm>
+            <a:off x="7526732" y="1700146"/>
+            <a:ext cx="696287" cy="276999"/>
+          </a:xfrm>
+          <a:prstGeom prst="rect">
+            <a:avLst/>
+          </a:prstGeom>
+          <a:noFill/>
+        </p:spPr>
+        <p:txBody>
+          <a:bodyPr wrap="square" rtlCol="0">
+            <a:spAutoFit/>
+          </a:bodyPr>
+          <a:lstStyle/>
+          <a:p>
+            <a:r>
+              <a:rPr lang="en-US" sz="1200" dirty="0" smtClean="0"/>
+              <a:t>request</a:t>
+            </a:r>
+            <a:endParaRPr lang="en-US" sz="1200" dirty="0"/>
+          </a:p>
+        </p:txBody>
+      </p:sp>
+      <p:sp>
+        <p:nvSpPr>
+          <p:cNvPr id="41" name="TextBox 40"/>
+          <p:cNvSpPr txBox="1"/>
+          <p:nvPr/>
+        </p:nvSpPr>
+        <p:spPr>
+          <a:xfrm>
+            <a:off x="7232544" y="2193998"/>
+            <a:ext cx="1504141" cy="276999"/>
+          </a:xfrm>
+          <a:prstGeom prst="rect">
+            <a:avLst/>
+          </a:prstGeom>
+          <a:noFill/>
+        </p:spPr>
+        <p:txBody>
+          <a:bodyPr wrap="square" rtlCol="0">
+            <a:spAutoFit/>
+          </a:bodyPr>
+          <a:lstStyle/>
+          <a:p>
+            <a:r>
+              <a:rPr lang="en-US" sz="1200" dirty="0" smtClean="0"/>
+              <a:t>Solved equations</a:t>
+            </a:r>
+            <a:endParaRPr lang="en-US" sz="1200" dirty="0"/>
+          </a:p>
+        </p:txBody>
+      </p:sp>
+      <p:sp>
+        <p:nvSpPr>
+          <p:cNvPr id="53" name="Rectangle 52"/>
+          <p:cNvSpPr/>
+          <p:nvPr/>
+        </p:nvSpPr>
+        <p:spPr>
+          <a:xfrm>
+            <a:off x="8627627" y="3572570"/>
+            <a:ext cx="1993753" cy="1767210"/>
+          </a:xfrm>
+          <a:prstGeom prst="rect">
+            <a:avLst/>
+          </a:prstGeom>
+          <a:noFill/>
+          <a:ln>
+            <a:solidFill>
+              <a:schemeClr val="tx1"/>
+            </a:solidFill>
+          </a:ln>
+        </p:spPr>
+        <p:style>
+          <a:lnRef idx="2">
+            <a:schemeClr val="accent1">
+              <a:shade val="50000"/>
+            </a:schemeClr>
+          </a:lnRef>
+          <a:fillRef idx="1">
+            <a:schemeClr val="accent1"/>
+          </a:fillRef>
+          <a:effectRef idx="0">
+            <a:schemeClr val="accent1"/>
+          </a:effectRef>
+          <a:fontRef idx="minor">
+            <a:schemeClr val="lt1"/>
+          </a:fontRef>
+        </p:style>
+        <p:txBody>
+          <a:bodyPr rtlCol="0" anchor="ctr"/>
+          <a:lstStyle/>
+          <a:p>
+            <a:pPr algn="ctr"/>
+            <a:r>
+              <a:rPr lang="en-US" dirty="0" smtClean="0">
+                <a:solidFill>
+                  <a:schemeClr val="tx1"/>
+                </a:solidFill>
+              </a:rPr>
+              <a:t>Other Services</a:t>
+            </a:r>
+            <a:endParaRPr lang="en-US" dirty="0">
+              <a:solidFill>
+                <a:schemeClr val="tx1"/>
+              </a:solidFill>
+            </a:endParaRPr>
+          </a:p>
+        </p:txBody>
+      </p:sp>
+      <p:cxnSp>
+        <p:nvCxnSpPr>
+          <p:cNvPr id="55" name="Straight Arrow Connector 54"/>
+          <p:cNvCxnSpPr/>
+          <p:nvPr/>
+        </p:nvCxnSpPr>
+        <p:spPr>
+          <a:xfrm>
+            <a:off x="9952372" y="2842863"/>
+            <a:ext cx="0" cy="729707"/>
+          </a:xfrm>
+          <a:prstGeom prst="straightConnector1">
+            <a:avLst/>
+          </a:prstGeom>
+          <a:ln>
+            <a:solidFill>
+              <a:schemeClr val="tx1"/>
+            </a:solidFill>
+            <a:tailEnd type="triangle"/>
+          </a:ln>
+        </p:spPr>
+        <p:style>
+          <a:lnRef idx="1">
+            <a:schemeClr val="accent1"/>
+          </a:lnRef>
+          <a:fillRef idx="0">
+            <a:schemeClr val="accent1"/>
+          </a:fillRef>
+          <a:effectRef idx="0">
+            <a:schemeClr val="accent1"/>
+          </a:effectRef>
+          <a:fontRef idx="minor">
+            <a:schemeClr val="tx1"/>
+          </a:fontRef>
+        </p:style>
+      </p:cxnSp>
+      <p:cxnSp>
+        <p:nvCxnSpPr>
+          <p:cNvPr id="56" name="Straight Arrow Connector 55"/>
+          <p:cNvCxnSpPr/>
+          <p:nvPr/>
+        </p:nvCxnSpPr>
+        <p:spPr>
+          <a:xfrm flipH="1" flipV="1">
+            <a:off x="9347700" y="2842864"/>
+            <a:ext cx="7951" cy="729706"/>
+          </a:xfrm>
+          <a:prstGeom prst="straightConnector1">
+            <a:avLst/>
+          </a:prstGeom>
+          <a:ln>
+            <a:solidFill>
+              <a:schemeClr val="tx1"/>
+            </a:solidFill>
+            <a:tailEnd type="triangle"/>
+          </a:ln>
+        </p:spPr>
+        <p:style>
+          <a:lnRef idx="1">
+            <a:schemeClr val="accent1"/>
+          </a:lnRef>
+          <a:fillRef idx="0">
+            <a:schemeClr val="accent1"/>
+          </a:fillRef>
+          <a:effectRef idx="0">
+            <a:schemeClr val="accent1"/>
+          </a:effectRef>
+          <a:fontRef idx="minor">
+            <a:schemeClr val="tx1"/>
+          </a:fontRef>
+        </p:style>
+      </p:cxnSp>
+      <p:sp>
+        <p:nvSpPr>
+          <p:cNvPr id="65" name="Right Arrow 64"/>
+          <p:cNvSpPr/>
+          <p:nvPr/>
+        </p:nvSpPr>
+        <p:spPr>
+          <a:xfrm rot="10800000">
+            <a:off x="3262826" y="4456175"/>
+            <a:ext cx="693682" cy="283780"/>
+          </a:xfrm>
+          <a:prstGeom prst="rightArrow">
+            <a:avLst/>
+          </a:prstGeom>
+          <a:noFill/>
+          <a:ln>
+            <a:solidFill>
+              <a:schemeClr val="tx1"/>
+            </a:solidFill>
+          </a:ln>
+        </p:spPr>
+        <p:style>
+          <a:lnRef idx="2">
+            <a:schemeClr val="accent1">
+              <a:shade val="50000"/>
+            </a:schemeClr>
+          </a:lnRef>
+          <a:fillRef idx="1">
+            <a:schemeClr val="accent1"/>
+          </a:fillRef>
+          <a:effectRef idx="0">
+            <a:schemeClr val="accent1"/>
+          </a:effectRef>
+          <a:fontRef idx="minor">
+            <a:schemeClr val="lt1"/>
+          </a:fontRef>
+        </p:style>
+        <p:txBody>
+          <a:bodyPr rtlCol="0" anchor="ctr"/>
+          <a:lstStyle/>
+          <a:p>
+            <a:pPr algn="ctr"/>
+            <a:endParaRPr lang="en-US"/>
+          </a:p>
+        </p:txBody>
+      </p:sp>
+      <p:pic>
+        <p:nvPicPr>
+          <p:cNvPr id="70" name="Picture 69"/>
+          <p:cNvPicPr>
+            <a:picLocks noChangeAspect="1"/>
+          </p:cNvPicPr>
+          <p:nvPr/>
+        </p:nvPicPr>
+        <p:blipFill>
+          <a:blip r:embed="rId3"/>
+          <a:stretch>
+            <a:fillRect/>
+          </a:stretch>
+        </p:blipFill>
+        <p:spPr>
+          <a:xfrm>
+            <a:off x="1453342" y="4080505"/>
+            <a:ext cx="1159874" cy="1159874"/>
+          </a:xfrm>
+          <a:prstGeom prst="rect">
+            <a:avLst/>
+          </a:prstGeom>
+        </p:spPr>
+      </p:pic>
+      <p:sp>
+        <p:nvSpPr>
+          <p:cNvPr id="71" name="TextBox 70"/>
+          <p:cNvSpPr txBox="1"/>
+          <p:nvPr/>
+        </p:nvSpPr>
+        <p:spPr>
+          <a:xfrm>
+            <a:off x="2978328" y="3904943"/>
+            <a:ext cx="1262679" cy="369332"/>
+          </a:xfrm>
+          <a:prstGeom prst="rect">
+            <a:avLst/>
+          </a:prstGeom>
+          <a:noFill/>
+        </p:spPr>
+        <p:txBody>
+          <a:bodyPr wrap="square" rtlCol="0">
+            <a:spAutoFit/>
+          </a:bodyPr>
+          <a:lstStyle/>
+          <a:p>
+            <a:pPr algn="ctr"/>
+            <a:r>
+              <a:rPr lang="en-US" dirty="0" smtClean="0"/>
+              <a:t>Output</a:t>
+            </a:r>
+            <a:endParaRPr lang="en-US" dirty="0"/>
+          </a:p>
+        </p:txBody>
+      </p:sp>
+    </p:spTree>
+    <p:extLst>
+      <p:ext uri="{BB962C8B-B14F-4D97-AF65-F5344CB8AC3E}">
+        <p14:creationId xmlns:p14="http://schemas.microsoft.com/office/powerpoint/2010/main" val="1496582715"/>
+      </p:ext>
+    </p:extLst>
+  </p:cSld>
+  <p:clrMapOvr>
+    <a:masterClrMapping/>
+  </p:clrMapOvr>
 </p:sld>
 </file>
 

</xml_diff>